<commit_message>
use env in build
</commit_message>
<xml_diff>
--- a/infra/Pipeline Design.pptx
+++ b/infra/Pipeline Design.pptx
@@ -9441,7 +9441,7 @@
       </p:sp>
       <p:pic>
         <p:nvPicPr>
-          <p:cNvPr id="2" name="Picture 1"/>
+          <p:cNvPr id="12" name="Picture 11"/>
           <p:cNvPicPr>
             <a:picLocks noChangeAspect="1"/>
           </p:cNvPicPr>
@@ -9455,8 +9455,8 @@
         </p:blipFill>
         <p:spPr>
           <a:xfrm>
-            <a:off x="285069" y="735466"/>
-            <a:ext cx="11153050" cy="5839505"/>
+            <a:off x="244564" y="681978"/>
+            <a:ext cx="11843448" cy="2747022"/>
           </a:xfrm>
           <a:prstGeom prst="rect">
             <a:avLst/>
@@ -9471,12 +9471,15 @@
         </p:nvSpPr>
         <p:spPr>
           <a:xfrm>
-            <a:off x="6111361" y="5078092"/>
-            <a:ext cx="6080639" cy="461665"/>
+            <a:off x="5056128" y="1824656"/>
+            <a:ext cx="6217921" cy="461665"/>
           </a:xfrm>
           <a:prstGeom prst="rect">
             <a:avLst/>
           </a:prstGeom>
+          <a:solidFill>
+            <a:schemeClr val="accent2"/>
+          </a:solidFill>
         </p:spPr>
         <p:txBody>
           <a:bodyPr wrap="none">
@@ -9485,14 +9488,14 @@
           <a:lstStyle/>
           <a:p>
             <a:r>
-              <a:rPr lang="en-US" sz="2400" dirty="0" smtClean="0"/>
+              <a:rPr lang="en-US" sz="2400" b="1" dirty="0" smtClean="0"/>
               <a:t>Build </a:t>
             </a:r>
             <a:r>
-              <a:rPr lang="en-US" sz="2400" dirty="0" smtClean="0"/>
+              <a:rPr lang="en-US" sz="2400" b="1" dirty="0" smtClean="0"/>
               <a:t>&amp; Test code, Tag &amp; Push Image to Registry</a:t>
             </a:r>
-            <a:endParaRPr lang="en-US" sz="2800" dirty="0" smtClean="0"/>
+            <a:endParaRPr lang="en-US" sz="2800" b="1" dirty="0" smtClean="0"/>
           </a:p>
         </p:txBody>
       </p:sp>

</xml_diff>